<commit_message>
add stop button (#28)
</commit_message>
<xml_diff>
--- a/docs/design/design.pptx
+++ b/docs/design/design.pptx
@@ -266,7 +266,7 @@
           <a:p>
             <a:fld id="{30DA0606-474F-417C-8DB0-81402E3BEFB0}" type="datetimeFigureOut">
               <a:rPr lang="en-US" smtClean="0"/>
-              <a:t>9/22/2017</a:t>
+              <a:t>9/23/2017</a:t>
             </a:fld>
             <a:endParaRPr lang="en-US"/>
           </a:p>
@@ -436,7 +436,7 @@
           <a:p>
             <a:fld id="{30DA0606-474F-417C-8DB0-81402E3BEFB0}" type="datetimeFigureOut">
               <a:rPr lang="en-US" smtClean="0"/>
-              <a:t>9/22/2017</a:t>
+              <a:t>9/23/2017</a:t>
             </a:fld>
             <a:endParaRPr lang="en-US"/>
           </a:p>
@@ -616,7 +616,7 @@
           <a:p>
             <a:fld id="{30DA0606-474F-417C-8DB0-81402E3BEFB0}" type="datetimeFigureOut">
               <a:rPr lang="en-US" smtClean="0"/>
-              <a:t>9/22/2017</a:t>
+              <a:t>9/23/2017</a:t>
             </a:fld>
             <a:endParaRPr lang="en-US"/>
           </a:p>
@@ -786,7 +786,7 @@
           <a:p>
             <a:fld id="{30DA0606-474F-417C-8DB0-81402E3BEFB0}" type="datetimeFigureOut">
               <a:rPr lang="en-US" smtClean="0"/>
-              <a:t>9/22/2017</a:t>
+              <a:t>9/23/2017</a:t>
             </a:fld>
             <a:endParaRPr lang="en-US"/>
           </a:p>
@@ -1032,7 +1032,7 @@
           <a:p>
             <a:fld id="{30DA0606-474F-417C-8DB0-81402E3BEFB0}" type="datetimeFigureOut">
               <a:rPr lang="en-US" smtClean="0"/>
-              <a:t>9/22/2017</a:t>
+              <a:t>9/23/2017</a:t>
             </a:fld>
             <a:endParaRPr lang="en-US"/>
           </a:p>
@@ -1264,7 +1264,7 @@
           <a:p>
             <a:fld id="{30DA0606-474F-417C-8DB0-81402E3BEFB0}" type="datetimeFigureOut">
               <a:rPr lang="en-US" smtClean="0"/>
-              <a:t>9/22/2017</a:t>
+              <a:t>9/23/2017</a:t>
             </a:fld>
             <a:endParaRPr lang="en-US"/>
           </a:p>
@@ -1631,7 +1631,7 @@
           <a:p>
             <a:fld id="{30DA0606-474F-417C-8DB0-81402E3BEFB0}" type="datetimeFigureOut">
               <a:rPr lang="en-US" smtClean="0"/>
-              <a:t>9/22/2017</a:t>
+              <a:t>9/23/2017</a:t>
             </a:fld>
             <a:endParaRPr lang="en-US"/>
           </a:p>
@@ -1749,7 +1749,7 @@
           <a:p>
             <a:fld id="{30DA0606-474F-417C-8DB0-81402E3BEFB0}" type="datetimeFigureOut">
               <a:rPr lang="en-US" smtClean="0"/>
-              <a:t>9/22/2017</a:t>
+              <a:t>9/23/2017</a:t>
             </a:fld>
             <a:endParaRPr lang="en-US"/>
           </a:p>
@@ -1844,7 +1844,7 @@
           <a:p>
             <a:fld id="{30DA0606-474F-417C-8DB0-81402E3BEFB0}" type="datetimeFigureOut">
               <a:rPr lang="en-US" smtClean="0"/>
-              <a:t>9/22/2017</a:t>
+              <a:t>9/23/2017</a:t>
             </a:fld>
             <a:endParaRPr lang="en-US"/>
           </a:p>
@@ -2121,7 +2121,7 @@
           <a:p>
             <a:fld id="{30DA0606-474F-417C-8DB0-81402E3BEFB0}" type="datetimeFigureOut">
               <a:rPr lang="en-US" smtClean="0"/>
-              <a:t>9/22/2017</a:t>
+              <a:t>9/23/2017</a:t>
             </a:fld>
             <a:endParaRPr lang="en-US"/>
           </a:p>
@@ -2374,7 +2374,7 @@
           <a:p>
             <a:fld id="{30DA0606-474F-417C-8DB0-81402E3BEFB0}" type="datetimeFigureOut">
               <a:rPr lang="en-US" smtClean="0"/>
-              <a:t>9/22/2017</a:t>
+              <a:t>9/23/2017</a:t>
             </a:fld>
             <a:endParaRPr lang="en-US"/>
           </a:p>
@@ -2587,7 +2587,7 @@
           <a:p>
             <a:fld id="{30DA0606-474F-417C-8DB0-81402E3BEFB0}" type="datetimeFigureOut">
               <a:rPr lang="en-US" smtClean="0"/>
-              <a:t>9/22/2017</a:t>
+              <a:t>9/23/2017</a:t>
             </a:fld>
             <a:endParaRPr lang="en-US"/>
           </a:p>
@@ -10473,14 +10473,14 @@
           <p:nvPr>
             <p:extLst>
               <p:ext uri="{D42A27DB-BD31-4B8C-83A1-F6EECF244321}">
-                <p14:modId xmlns:p14="http://schemas.microsoft.com/office/powerpoint/2010/main" val="3817183638"/>
+                <p14:modId xmlns:p14="http://schemas.microsoft.com/office/powerpoint/2010/main" val="475005271"/>
               </p:ext>
             </p:extLst>
           </p:nvPr>
         </p:nvGraphicFramePr>
         <p:xfrm>
           <a:off x="1192246" y="1092890"/>
-          <a:ext cx="9528630" cy="1112520"/>
+          <a:ext cx="9528630" cy="1529080"/>
         </p:xfrm>
         <a:graphic>
           <a:graphicData uri="http://schemas.openxmlformats.org/drawingml/2006/table">
@@ -10489,8 +10489,8 @@
                 <a:tableStyleId>{5C22544A-7EE6-4342-B048-85BDC9FD1C3A}</a:tableStyleId>
               </a:tblPr>
               <a:tblGrid>
-                <a:gridCol w="1905726"/>
-                <a:gridCol w="1905726"/>
+                <a:gridCol w="2642636"/>
+                <a:gridCol w="1168816"/>
                 <a:gridCol w="1905726"/>
                 <a:gridCol w="1905726"/>
                 <a:gridCol w="1905726"/>
@@ -10574,86 +10574,180 @@
                     <a:lstStyle/>
                     <a:p>
                       <a:r>
-                        <a:rPr lang="en-US" dirty="0" smtClean="0"/>
+                        <a:rPr lang="en-US" sz="1400" kern="1200" dirty="0" smtClean="0">
+                          <a:solidFill>
+                            <a:schemeClr val="dk1"/>
+                          </a:solidFill>
+                          <a:latin typeface="+mn-lt"/>
+                          <a:ea typeface="+mn-ea"/>
+                          <a:cs typeface="+mn-cs"/>
+                        </a:rPr>
                         <a:t>/</a:t>
                       </a:r>
                       <a:r>
-                        <a:rPr lang="en-US" dirty="0" err="1" smtClean="0"/>
+                        <a:rPr lang="en-US" sz="1400" kern="1200" dirty="0" err="1" smtClean="0">
+                          <a:solidFill>
+                            <a:schemeClr val="dk1"/>
+                          </a:solidFill>
+                          <a:latin typeface="+mn-lt"/>
+                          <a:ea typeface="+mn-ea"/>
+                          <a:cs typeface="+mn-cs"/>
+                        </a:rPr>
                         <a:t>api</a:t>
                       </a:r>
                       <a:r>
-                        <a:rPr lang="en-US" dirty="0" smtClean="0"/>
+                        <a:rPr lang="en-US" sz="1400" kern="1200" dirty="0" smtClean="0">
+                          <a:solidFill>
+                            <a:schemeClr val="dk1"/>
+                          </a:solidFill>
+                          <a:latin typeface="+mn-lt"/>
+                          <a:ea typeface="+mn-ea"/>
+                          <a:cs typeface="+mn-cs"/>
+                        </a:rPr>
                         <a:t>/search/start</a:t>
                       </a:r>
-                      <a:endParaRPr lang="en-US" dirty="0"/>
-                    </a:p>
-                  </a:txBody>
-                  <a:tcPr/>
-                </a:tc>
-                <a:tc>
-                  <a:txBody>
-                    <a:bodyPr/>
-                    <a:lstStyle/>
-                    <a:p>
-                      <a:r>
-                        <a:rPr lang="en-US" dirty="0" smtClean="0"/>
+                      <a:endParaRPr lang="en-US" sz="1400" kern="1200" dirty="0">
+                        <a:solidFill>
+                          <a:schemeClr val="dk1"/>
+                        </a:solidFill>
+                        <a:latin typeface="+mn-lt"/>
+                        <a:ea typeface="+mn-ea"/>
+                        <a:cs typeface="+mn-cs"/>
+                      </a:endParaRPr>
+                    </a:p>
+                  </a:txBody>
+                  <a:tcPr/>
+                </a:tc>
+                <a:tc>
+                  <a:txBody>
+                    <a:bodyPr/>
+                    <a:lstStyle/>
+                    <a:p>
+                      <a:r>
+                        <a:rPr lang="en-US" sz="1400" kern="1200" dirty="0" smtClean="0">
+                          <a:solidFill>
+                            <a:schemeClr val="dk1"/>
+                          </a:solidFill>
+                          <a:latin typeface="+mn-lt"/>
+                          <a:ea typeface="+mn-ea"/>
+                          <a:cs typeface="+mn-cs"/>
+                        </a:rPr>
                         <a:t>POST</a:t>
                       </a:r>
-                      <a:endParaRPr lang="en-US" dirty="0"/>
-                    </a:p>
-                  </a:txBody>
-                  <a:tcPr/>
-                </a:tc>
-                <a:tc>
-                  <a:txBody>
-                    <a:bodyPr/>
-                    <a:lstStyle/>
-                    <a:p>
-                      <a:r>
-                        <a:rPr lang="en-US" dirty="0" smtClean="0"/>
+                      <a:endParaRPr lang="en-US" sz="1400" kern="1200" dirty="0">
+                        <a:solidFill>
+                          <a:schemeClr val="dk1"/>
+                        </a:solidFill>
+                        <a:latin typeface="+mn-lt"/>
+                        <a:ea typeface="+mn-ea"/>
+                        <a:cs typeface="+mn-cs"/>
+                      </a:endParaRPr>
+                    </a:p>
+                  </a:txBody>
+                  <a:tcPr/>
+                </a:tc>
+                <a:tc>
+                  <a:txBody>
+                    <a:bodyPr/>
+                    <a:lstStyle/>
+                    <a:p>
+                      <a:r>
+                        <a:rPr lang="en-US" sz="1400" kern="1200" dirty="0" smtClean="0">
+                          <a:solidFill>
+                            <a:schemeClr val="dk1"/>
+                          </a:solidFill>
+                          <a:latin typeface="+mn-lt"/>
+                          <a:ea typeface="+mn-ea"/>
+                          <a:cs typeface="+mn-cs"/>
+                        </a:rPr>
                         <a:t>{</a:t>
                       </a:r>
                       <a:r>
-                        <a:rPr lang="en-US" dirty="0" err="1" smtClean="0"/>
+                        <a:rPr lang="en-US" sz="1400" kern="1200" dirty="0" err="1" smtClean="0">
+                          <a:solidFill>
+                            <a:schemeClr val="dk1"/>
+                          </a:solidFill>
+                          <a:latin typeface="+mn-lt"/>
+                          <a:ea typeface="+mn-ea"/>
+                          <a:cs typeface="+mn-cs"/>
+                        </a:rPr>
                         <a:t>url</a:t>
                       </a:r>
                       <a:r>
-                        <a:rPr lang="en-US" dirty="0" smtClean="0"/>
+                        <a:rPr lang="en-US" sz="1400" kern="1200" dirty="0" smtClean="0">
+                          <a:solidFill>
+                            <a:schemeClr val="dk1"/>
+                          </a:solidFill>
+                          <a:latin typeface="+mn-lt"/>
+                          <a:ea typeface="+mn-ea"/>
+                          <a:cs typeface="+mn-cs"/>
+                        </a:rPr>
                         <a:t>}</a:t>
                       </a:r>
-                      <a:endParaRPr lang="en-US" dirty="0"/>
-                    </a:p>
-                  </a:txBody>
-                  <a:tcPr/>
-                </a:tc>
-                <a:tc>
-                  <a:txBody>
-                    <a:bodyPr/>
-                    <a:lstStyle/>
-                    <a:p>
-                      <a:r>
-                        <a:rPr lang="en-US" sz="1400" dirty="0" smtClean="0"/>
-                        <a:t>{query</a:t>
-                      </a:r>
-                      <a:r>
-                        <a:rPr lang="en-US" sz="1400" baseline="0" dirty="0" smtClean="0"/>
-                        <a:t> ID}</a:t>
-                      </a:r>
-                      <a:endParaRPr lang="en-US" sz="1400" dirty="0"/>
-                    </a:p>
-                  </a:txBody>
-                  <a:tcPr/>
-                </a:tc>
-                <a:tc>
-                  <a:txBody>
-                    <a:bodyPr/>
-                    <a:lstStyle/>
-                    <a:p>
-                      <a:r>
-                        <a:rPr lang="en-US" dirty="0" smtClean="0"/>
+                      <a:endParaRPr lang="en-US" sz="1400" kern="1200" dirty="0">
+                        <a:solidFill>
+                          <a:schemeClr val="dk1"/>
+                        </a:solidFill>
+                        <a:latin typeface="+mn-lt"/>
+                        <a:ea typeface="+mn-ea"/>
+                        <a:cs typeface="+mn-cs"/>
+                      </a:endParaRPr>
+                    </a:p>
+                  </a:txBody>
+                  <a:tcPr/>
+                </a:tc>
+                <a:tc>
+                  <a:txBody>
+                    <a:bodyPr/>
+                    <a:lstStyle/>
+                    <a:p>
+                      <a:r>
+                        <a:rPr lang="en-US" sz="1400" kern="1200" dirty="0" smtClean="0">
+                          <a:solidFill>
+                            <a:schemeClr val="dk1"/>
+                          </a:solidFill>
+                          <a:latin typeface="+mn-lt"/>
+                          <a:ea typeface="+mn-ea"/>
+                          <a:cs typeface="+mn-cs"/>
+                        </a:rPr>
+                        <a:t>{query ID}</a:t>
+                      </a:r>
+                      <a:endParaRPr lang="en-US" sz="1400" kern="1200" dirty="0">
+                        <a:solidFill>
+                          <a:schemeClr val="dk1"/>
+                        </a:solidFill>
+                        <a:latin typeface="+mn-lt"/>
+                        <a:ea typeface="+mn-ea"/>
+                        <a:cs typeface="+mn-cs"/>
+                      </a:endParaRPr>
+                    </a:p>
+                  </a:txBody>
+                  <a:tcPr/>
+                </a:tc>
+                <a:tc>
+                  <a:txBody>
+                    <a:bodyPr/>
+                    <a:lstStyle/>
+                    <a:p>
+                      <a:r>
+                        <a:rPr lang="en-US" sz="1400" kern="1200" dirty="0" smtClean="0">
+                          <a:solidFill>
+                            <a:schemeClr val="dk1"/>
+                          </a:solidFill>
+                          <a:latin typeface="+mn-lt"/>
+                          <a:ea typeface="+mn-ea"/>
+                          <a:cs typeface="+mn-cs"/>
+                        </a:rPr>
                         <a:t>Start a search</a:t>
                       </a:r>
-                      <a:endParaRPr lang="en-US" dirty="0"/>
+                      <a:endParaRPr lang="en-US" sz="1400" kern="1200" dirty="0">
+                        <a:solidFill>
+                          <a:schemeClr val="dk1"/>
+                        </a:solidFill>
+                        <a:latin typeface="+mn-lt"/>
+                        <a:ea typeface="+mn-ea"/>
+                        <a:cs typeface="+mn-cs"/>
+                      </a:endParaRPr>
                     </a:p>
                   </a:txBody>
                   <a:tcPr/>
@@ -10666,33 +10760,56 @@
                     <a:lstStyle/>
                     <a:p>
                       <a:r>
-                        <a:rPr lang="en-US" dirty="0" smtClean="0">
+                        <a:rPr lang="en-US" sz="1400" kern="1200" dirty="0" smtClean="0">
                           <a:solidFill>
-                            <a:srgbClr val="7030A0"/>
+                            <a:schemeClr val="dk1"/>
                           </a:solidFill>
+                          <a:latin typeface="+mn-lt"/>
+                          <a:ea typeface="+mn-ea"/>
+                          <a:cs typeface="+mn-cs"/>
                         </a:rPr>
                         <a:t>/</a:t>
                       </a:r>
                       <a:r>
-                        <a:rPr lang="en-US" dirty="0" err="1" smtClean="0">
+                        <a:rPr lang="en-US" sz="1400" kern="1200" dirty="0" err="1" smtClean="0">
                           <a:solidFill>
-                            <a:srgbClr val="7030A0"/>
+                            <a:schemeClr val="dk1"/>
                           </a:solidFill>
+                          <a:latin typeface="+mn-lt"/>
+                          <a:ea typeface="+mn-ea"/>
+                          <a:cs typeface="+mn-cs"/>
                         </a:rPr>
                         <a:t>api</a:t>
                       </a:r>
                       <a:r>
-                        <a:rPr lang="en-US" dirty="0" smtClean="0">
+                        <a:rPr lang="en-US" sz="1400" kern="1200" dirty="0" smtClean="0">
                           <a:solidFill>
-                            <a:srgbClr val="7030A0"/>
+                            <a:schemeClr val="dk1"/>
                           </a:solidFill>
+                          <a:latin typeface="+mn-lt"/>
+                          <a:ea typeface="+mn-ea"/>
+                          <a:cs typeface="+mn-cs"/>
                         </a:rPr>
-                        <a:t>/search/stop</a:t>
-                      </a:r>
-                      <a:endParaRPr lang="en-US" dirty="0">
+                        <a:t>/search</a:t>
+                      </a:r>
+                      <a:r>
+                        <a:rPr lang="en-US" sz="1400" kern="1200" dirty="0" smtClean="0">
+                          <a:solidFill>
+                            <a:schemeClr val="dk1"/>
+                          </a:solidFill>
+                          <a:latin typeface="+mn-lt"/>
+                          <a:ea typeface="+mn-ea"/>
+                          <a:cs typeface="+mn-cs"/>
+                        </a:rPr>
+                        <a:t>/{query id}/stop</a:t>
+                      </a:r>
+                      <a:endParaRPr lang="en-US" sz="1400" kern="1200" dirty="0">
                         <a:solidFill>
-                          <a:srgbClr val="7030A0"/>
+                          <a:schemeClr val="dk1"/>
                         </a:solidFill>
+                        <a:latin typeface="+mn-lt"/>
+                        <a:ea typeface="+mn-ea"/>
+                        <a:cs typeface="+mn-cs"/>
                       </a:endParaRPr>
                     </a:p>
                   </a:txBody>
@@ -10704,17 +10821,23 @@
                     <a:lstStyle/>
                     <a:p>
                       <a:r>
-                        <a:rPr lang="en-US" dirty="0" smtClean="0">
+                        <a:rPr lang="en-US" sz="1400" kern="1200" dirty="0" smtClean="0">
                           <a:solidFill>
-                            <a:srgbClr val="7030A0"/>
+                            <a:schemeClr val="dk1"/>
                           </a:solidFill>
+                          <a:latin typeface="+mn-lt"/>
+                          <a:ea typeface="+mn-ea"/>
+                          <a:cs typeface="+mn-cs"/>
                         </a:rPr>
                         <a:t>POST</a:t>
                       </a:r>
-                      <a:endParaRPr lang="en-US" dirty="0">
+                      <a:endParaRPr lang="en-US" sz="1400" kern="1200" dirty="0">
                         <a:solidFill>
-                          <a:srgbClr val="7030A0"/>
+                          <a:schemeClr val="dk1"/>
                         </a:solidFill>
+                        <a:latin typeface="+mn-lt"/>
+                        <a:ea typeface="+mn-ea"/>
+                        <a:cs typeface="+mn-cs"/>
                       </a:endParaRPr>
                     </a:p>
                   </a:txBody>
@@ -10725,10 +10848,13 @@
                     <a:bodyPr/>
                     <a:lstStyle/>
                     <a:p>
-                      <a:endParaRPr lang="en-US" dirty="0">
+                      <a:endParaRPr lang="en-US" sz="1400" kern="1200" dirty="0">
                         <a:solidFill>
-                          <a:srgbClr val="7030A0"/>
+                          <a:schemeClr val="dk1"/>
                         </a:solidFill>
+                        <a:latin typeface="+mn-lt"/>
+                        <a:ea typeface="+mn-ea"/>
+                        <a:cs typeface="+mn-cs"/>
                       </a:endParaRPr>
                     </a:p>
                   </a:txBody>
@@ -10739,10 +10865,43 @@
                     <a:bodyPr/>
                     <a:lstStyle/>
                     <a:p>
-                      <a:endParaRPr lang="en-US" sz="1400" dirty="0">
+                      <a:pPr marL="0" marR="0" lvl="0" indent="0" algn="l" defTabSz="914400" rtl="0" eaLnBrk="1" fontAlgn="auto" latinLnBrk="0" hangingPunct="1">
+                        <a:lnSpc>
+                          <a:spcPct val="100000"/>
+                        </a:lnSpc>
+                        <a:spcBef>
+                          <a:spcPts val="0"/>
+                        </a:spcBef>
+                        <a:spcAft>
+                          <a:spcPts val="0"/>
+                        </a:spcAft>
+                        <a:buClrTx/>
+                        <a:buSzTx/>
+                        <a:buFontTx/>
+                        <a:buNone/>
+                        <a:tabLst/>
+                        <a:defRPr/>
+                      </a:pPr>
+                      <a:r>
+                        <a:rPr lang="en-US" sz="1400" kern="1200" dirty="0" smtClean="0">
+                          <a:solidFill>
+                            <a:schemeClr val="dk1"/>
+                          </a:solidFill>
+                          <a:latin typeface="+mn-lt"/>
+                          <a:ea typeface="+mn-ea"/>
+                          <a:cs typeface="+mn-cs"/>
+                        </a:rPr>
+                        <a:t>{query ID}</a:t>
+                      </a:r>
+                    </a:p>
+                    <a:p>
+                      <a:endParaRPr lang="en-US" sz="1400" kern="1200" dirty="0">
                         <a:solidFill>
-                          <a:srgbClr val="7030A0"/>
+                          <a:schemeClr val="dk1"/>
                         </a:solidFill>
+                        <a:latin typeface="+mn-lt"/>
+                        <a:ea typeface="+mn-ea"/>
+                        <a:cs typeface="+mn-cs"/>
                       </a:endParaRPr>
                     </a:p>
                   </a:txBody>
@@ -10754,17 +10913,23 @@
                     <a:lstStyle/>
                     <a:p>
                       <a:r>
-                        <a:rPr lang="en-US" dirty="0" smtClean="0">
+                        <a:rPr lang="en-US" sz="1400" kern="1200" dirty="0" smtClean="0">
                           <a:solidFill>
-                            <a:srgbClr val="7030A0"/>
+                            <a:schemeClr val="dk1"/>
                           </a:solidFill>
+                          <a:latin typeface="+mn-lt"/>
+                          <a:ea typeface="+mn-ea"/>
+                          <a:cs typeface="+mn-cs"/>
                         </a:rPr>
                         <a:t>Stop a search</a:t>
                       </a:r>
-                      <a:endParaRPr lang="en-US" dirty="0">
+                      <a:endParaRPr lang="en-US" sz="1400" kern="1200" dirty="0">
                         <a:solidFill>
-                          <a:srgbClr val="7030A0"/>
+                          <a:schemeClr val="dk1"/>
                         </a:solidFill>
+                        <a:latin typeface="+mn-lt"/>
+                        <a:ea typeface="+mn-ea"/>
+                        <a:cs typeface="+mn-cs"/>
                       </a:endParaRPr>
                     </a:p>
                   </a:txBody>
@@ -14491,15 +14656,7 @@
             </a:r>
             <a:r>
               <a:rPr lang="en-US" dirty="0" smtClean="0"/>
-              <a:t> state is ‘STOPPED</a:t>
-            </a:r>
-            <a:r>
-              <a:rPr lang="en-US" dirty="0" smtClean="0"/>
-              <a:t>’ or ‘STOP_PAGE’, </a:t>
-            </a:r>
-            <a:r>
-              <a:rPr lang="en-US" dirty="0" smtClean="0"/>
-              <a:t>stop parsing</a:t>
+              <a:t> state is ‘STOPPED’ or ‘STOP_PAGE’, stop parsing</a:t>
             </a:r>
           </a:p>
           <a:p>
@@ -14509,15 +14666,7 @@
             </a:pPr>
             <a:r>
               <a:rPr lang="en-US" dirty="0" smtClean="0"/>
-              <a:t>Check count in page topology for this ID. If count exceeds page query limit stop parsing, set query state to </a:t>
-            </a:r>
-            <a:r>
-              <a:rPr lang="en-US" dirty="0" smtClean="0"/>
-              <a:t>‘STOP_PAGE’ </a:t>
-            </a:r>
-            <a:r>
-              <a:rPr lang="en-US" dirty="0" smtClean="0"/>
-              <a:t>and stop parsing</a:t>
+              <a:t>Check count in page topology for this ID. If count exceeds page query limit stop parsing, set query state to ‘STOP_PAGE’ and stop parsing</a:t>
             </a:r>
           </a:p>
           <a:p>
@@ -14775,13 +14924,8 @@
             </a:r>
             <a:r>
               <a:rPr lang="en-US" dirty="0" smtClean="0"/>
-              <a:t>, </a:t>
-            </a:r>
-            <a:r>
-              <a:rPr lang="en-US" dirty="0" smtClean="0"/>
-              <a:t>set state to STOPPED and return</a:t>
-            </a:r>
-            <a:endParaRPr lang="en-US" dirty="0" smtClean="0"/>
+              <a:t>, set state to STOPPED and return</a:t>
+            </a:r>
           </a:p>
           <a:p>
             <a:pPr marL="800100" lvl="1" indent="-342900">
@@ -15033,7 +15177,6 @@
               <a:rPr lang="en-US" dirty="0" smtClean="0"/>
               <a:t>Set status to STOPPED</a:t>
             </a:r>
-            <a:endParaRPr lang="en-US" dirty="0" smtClean="0"/>
           </a:p>
         </p:txBody>
       </p:sp>

</xml_diff>

<commit_message>
Pull Last Results (#33)
* pull default values during refresh

* Add url of last search result
</commit_message>
<xml_diff>
--- a/docs/design/design.pptx
+++ b/docs/design/design.pptx
@@ -266,7 +266,7 @@
           <a:p>
             <a:fld id="{30DA0606-474F-417C-8DB0-81402E3BEFB0}" type="datetimeFigureOut">
               <a:rPr lang="en-US" smtClean="0"/>
-              <a:t>9/23/2017</a:t>
+              <a:t>4/28/2018</a:t>
             </a:fld>
             <a:endParaRPr lang="en-US"/>
           </a:p>
@@ -436,7 +436,7 @@
           <a:p>
             <a:fld id="{30DA0606-474F-417C-8DB0-81402E3BEFB0}" type="datetimeFigureOut">
               <a:rPr lang="en-US" smtClean="0"/>
-              <a:t>9/23/2017</a:t>
+              <a:t>4/28/2018</a:t>
             </a:fld>
             <a:endParaRPr lang="en-US"/>
           </a:p>
@@ -616,7 +616,7 @@
           <a:p>
             <a:fld id="{30DA0606-474F-417C-8DB0-81402E3BEFB0}" type="datetimeFigureOut">
               <a:rPr lang="en-US" smtClean="0"/>
-              <a:t>9/23/2017</a:t>
+              <a:t>4/28/2018</a:t>
             </a:fld>
             <a:endParaRPr lang="en-US"/>
           </a:p>
@@ -786,7 +786,7 @@
           <a:p>
             <a:fld id="{30DA0606-474F-417C-8DB0-81402E3BEFB0}" type="datetimeFigureOut">
               <a:rPr lang="en-US" smtClean="0"/>
-              <a:t>9/23/2017</a:t>
+              <a:t>4/28/2018</a:t>
             </a:fld>
             <a:endParaRPr lang="en-US"/>
           </a:p>
@@ -1032,7 +1032,7 @@
           <a:p>
             <a:fld id="{30DA0606-474F-417C-8DB0-81402E3BEFB0}" type="datetimeFigureOut">
               <a:rPr lang="en-US" smtClean="0"/>
-              <a:t>9/23/2017</a:t>
+              <a:t>4/28/2018</a:t>
             </a:fld>
             <a:endParaRPr lang="en-US"/>
           </a:p>
@@ -1264,7 +1264,7 @@
           <a:p>
             <a:fld id="{30DA0606-474F-417C-8DB0-81402E3BEFB0}" type="datetimeFigureOut">
               <a:rPr lang="en-US" smtClean="0"/>
-              <a:t>9/23/2017</a:t>
+              <a:t>4/28/2018</a:t>
             </a:fld>
             <a:endParaRPr lang="en-US"/>
           </a:p>
@@ -1631,7 +1631,7 @@
           <a:p>
             <a:fld id="{30DA0606-474F-417C-8DB0-81402E3BEFB0}" type="datetimeFigureOut">
               <a:rPr lang="en-US" smtClean="0"/>
-              <a:t>9/23/2017</a:t>
+              <a:t>4/28/2018</a:t>
             </a:fld>
             <a:endParaRPr lang="en-US"/>
           </a:p>
@@ -1749,7 +1749,7 @@
           <a:p>
             <a:fld id="{30DA0606-474F-417C-8DB0-81402E3BEFB0}" type="datetimeFigureOut">
               <a:rPr lang="en-US" smtClean="0"/>
-              <a:t>9/23/2017</a:t>
+              <a:t>4/28/2018</a:t>
             </a:fld>
             <a:endParaRPr lang="en-US"/>
           </a:p>
@@ -1844,7 +1844,7 @@
           <a:p>
             <a:fld id="{30DA0606-474F-417C-8DB0-81402E3BEFB0}" type="datetimeFigureOut">
               <a:rPr lang="en-US" smtClean="0"/>
-              <a:t>9/23/2017</a:t>
+              <a:t>4/28/2018</a:t>
             </a:fld>
             <a:endParaRPr lang="en-US"/>
           </a:p>
@@ -2121,7 +2121,7 @@
           <a:p>
             <a:fld id="{30DA0606-474F-417C-8DB0-81402E3BEFB0}" type="datetimeFigureOut">
               <a:rPr lang="en-US" smtClean="0"/>
-              <a:t>9/23/2017</a:t>
+              <a:t>4/28/2018</a:t>
             </a:fld>
             <a:endParaRPr lang="en-US"/>
           </a:p>
@@ -2374,7 +2374,7 @@
           <a:p>
             <a:fld id="{30DA0606-474F-417C-8DB0-81402E3BEFB0}" type="datetimeFigureOut">
               <a:rPr lang="en-US" smtClean="0"/>
-              <a:t>9/23/2017</a:t>
+              <a:t>4/28/2018</a:t>
             </a:fld>
             <a:endParaRPr lang="en-US"/>
           </a:p>
@@ -2587,7 +2587,7 @@
           <a:p>
             <a:fld id="{30DA0606-474F-417C-8DB0-81402E3BEFB0}" type="datetimeFigureOut">
               <a:rPr lang="en-US" smtClean="0"/>
-              <a:t>9/23/2017</a:t>
+              <a:t>4/28/2018</a:t>
             </a:fld>
             <a:endParaRPr lang="en-US"/>
           </a:p>
@@ -10473,14 +10473,14 @@
           <p:nvPr>
             <p:extLst>
               <p:ext uri="{D42A27DB-BD31-4B8C-83A1-F6EECF244321}">
-                <p14:modId xmlns:p14="http://schemas.microsoft.com/office/powerpoint/2010/main" val="475005271"/>
+                <p14:modId xmlns:p14="http://schemas.microsoft.com/office/powerpoint/2010/main" val="3374879066"/>
               </p:ext>
             </p:extLst>
           </p:nvPr>
         </p:nvGraphicFramePr>
         <p:xfrm>
           <a:off x="1192246" y="1092890"/>
-          <a:ext cx="9528630" cy="1529080"/>
+          <a:ext cx="9528630" cy="2047240"/>
         </p:xfrm>
         <a:graphic>
           <a:graphicData uri="http://schemas.openxmlformats.org/drawingml/2006/table">
@@ -10790,18 +10790,7 @@
                           <a:ea typeface="+mn-ea"/>
                           <a:cs typeface="+mn-cs"/>
                         </a:rPr>
-                        <a:t>/search</a:t>
-                      </a:r>
-                      <a:r>
-                        <a:rPr lang="en-US" sz="1400" kern="1200" dirty="0" smtClean="0">
-                          <a:solidFill>
-                            <a:schemeClr val="dk1"/>
-                          </a:solidFill>
-                          <a:latin typeface="+mn-lt"/>
-                          <a:ea typeface="+mn-ea"/>
-                          <a:cs typeface="+mn-cs"/>
-                        </a:rPr>
-                        <a:t>/{query id}/stop</a:t>
+                        <a:t>/search/{query id}/stop</a:t>
                       </a:r>
                       <a:endParaRPr lang="en-US" sz="1400" kern="1200" dirty="0">
                         <a:solidFill>
@@ -10922,6 +10911,192 @@
                           <a:cs typeface="+mn-cs"/>
                         </a:rPr>
                         <a:t>Stop a search</a:t>
+                      </a:r>
+                      <a:endParaRPr lang="en-US" sz="1400" kern="1200" dirty="0">
+                        <a:solidFill>
+                          <a:schemeClr val="dk1"/>
+                        </a:solidFill>
+                        <a:latin typeface="+mn-lt"/>
+                        <a:ea typeface="+mn-ea"/>
+                        <a:cs typeface="+mn-cs"/>
+                      </a:endParaRPr>
+                    </a:p>
+                  </a:txBody>
+                  <a:tcPr/>
+                </a:tc>
+              </a:tr>
+              <a:tr h="370840">
+                <a:tc>
+                  <a:txBody>
+                    <a:bodyPr/>
+                    <a:lstStyle/>
+                    <a:p>
+                      <a:r>
+                        <a:rPr lang="en-US" sz="1400" kern="1200" dirty="0" smtClean="0">
+                          <a:solidFill>
+                            <a:schemeClr val="dk1"/>
+                          </a:solidFill>
+                          <a:latin typeface="+mn-lt"/>
+                          <a:ea typeface="+mn-ea"/>
+                          <a:cs typeface="+mn-cs"/>
+                        </a:rPr>
+                        <a:t>/</a:t>
+                      </a:r>
+                      <a:r>
+                        <a:rPr lang="en-US" sz="1400" kern="1200" dirty="0" err="1" smtClean="0">
+                          <a:solidFill>
+                            <a:schemeClr val="dk1"/>
+                          </a:solidFill>
+                          <a:latin typeface="+mn-lt"/>
+                          <a:ea typeface="+mn-ea"/>
+                          <a:cs typeface="+mn-cs"/>
+                        </a:rPr>
+                        <a:t>api</a:t>
+                      </a:r>
+                      <a:r>
+                        <a:rPr lang="en-US" sz="1400" kern="1200" dirty="0" smtClean="0">
+                          <a:solidFill>
+                            <a:schemeClr val="dk1"/>
+                          </a:solidFill>
+                          <a:latin typeface="+mn-lt"/>
+                          <a:ea typeface="+mn-ea"/>
+                          <a:cs typeface="+mn-cs"/>
+                        </a:rPr>
+                        <a:t>/search/latest</a:t>
+                      </a:r>
+                      <a:endParaRPr lang="en-US" sz="1400" kern="1200" dirty="0">
+                        <a:solidFill>
+                          <a:schemeClr val="dk1"/>
+                        </a:solidFill>
+                        <a:latin typeface="+mn-lt"/>
+                        <a:ea typeface="+mn-ea"/>
+                        <a:cs typeface="+mn-cs"/>
+                      </a:endParaRPr>
+                    </a:p>
+                  </a:txBody>
+                  <a:tcPr/>
+                </a:tc>
+                <a:tc>
+                  <a:txBody>
+                    <a:bodyPr/>
+                    <a:lstStyle/>
+                    <a:p>
+                      <a:r>
+                        <a:rPr lang="en-US" sz="1400" kern="1200" dirty="0" smtClean="0">
+                          <a:solidFill>
+                            <a:schemeClr val="dk1"/>
+                          </a:solidFill>
+                          <a:latin typeface="+mn-lt"/>
+                          <a:ea typeface="+mn-ea"/>
+                          <a:cs typeface="+mn-cs"/>
+                        </a:rPr>
+                        <a:t>GET</a:t>
+                      </a:r>
+                      <a:endParaRPr lang="en-US" sz="1400" kern="1200" dirty="0">
+                        <a:solidFill>
+                          <a:schemeClr val="dk1"/>
+                        </a:solidFill>
+                        <a:latin typeface="+mn-lt"/>
+                        <a:ea typeface="+mn-ea"/>
+                        <a:cs typeface="+mn-cs"/>
+                      </a:endParaRPr>
+                    </a:p>
+                  </a:txBody>
+                  <a:tcPr/>
+                </a:tc>
+                <a:tc>
+                  <a:txBody>
+                    <a:bodyPr/>
+                    <a:lstStyle/>
+                    <a:p>
+                      <a:endParaRPr lang="en-US" sz="1400" kern="1200" dirty="0">
+                        <a:solidFill>
+                          <a:schemeClr val="dk1"/>
+                        </a:solidFill>
+                        <a:latin typeface="+mn-lt"/>
+                        <a:ea typeface="+mn-ea"/>
+                        <a:cs typeface="+mn-cs"/>
+                      </a:endParaRPr>
+                    </a:p>
+                  </a:txBody>
+                  <a:tcPr/>
+                </a:tc>
+                <a:tc>
+                  <a:txBody>
+                    <a:bodyPr/>
+                    <a:lstStyle/>
+                    <a:p>
+                      <a:r>
+                        <a:rPr lang="en-US" sz="1400" kern="1200" dirty="0" smtClean="0">
+                          <a:solidFill>
+                            <a:schemeClr val="dk1"/>
+                          </a:solidFill>
+                          <a:latin typeface="+mn-lt"/>
+                          <a:ea typeface="+mn-ea"/>
+                          <a:cs typeface="+mn-cs"/>
+                        </a:rPr>
+                        <a:t>{query ID,</a:t>
+                      </a:r>
+                      <a:r>
+                        <a:rPr lang="en-US" sz="1400" kern="1200" baseline="0" dirty="0" smtClean="0">
+                          <a:solidFill>
+                            <a:schemeClr val="dk1"/>
+                          </a:solidFill>
+                          <a:latin typeface="+mn-lt"/>
+                          <a:ea typeface="+mn-ea"/>
+                          <a:cs typeface="+mn-cs"/>
+                        </a:rPr>
+                        <a:t> URL}</a:t>
+                      </a:r>
+                      <a:endParaRPr lang="en-US" sz="1400" kern="1200" dirty="0">
+                        <a:solidFill>
+                          <a:schemeClr val="dk1"/>
+                        </a:solidFill>
+                        <a:latin typeface="+mn-lt"/>
+                        <a:ea typeface="+mn-ea"/>
+                        <a:cs typeface="+mn-cs"/>
+                      </a:endParaRPr>
+                    </a:p>
+                  </a:txBody>
+                  <a:tcPr/>
+                </a:tc>
+                <a:tc>
+                  <a:txBody>
+                    <a:bodyPr/>
+                    <a:lstStyle/>
+                    <a:p>
+                      <a:r>
+                        <a:rPr lang="en-US" sz="1400" kern="1200" dirty="0" smtClean="0">
+                          <a:solidFill>
+                            <a:schemeClr val="dk1"/>
+                          </a:solidFill>
+                          <a:latin typeface="+mn-lt"/>
+                          <a:ea typeface="+mn-ea"/>
+                          <a:cs typeface="+mn-cs"/>
+                        </a:rPr>
+                        <a:t>Return metadata</a:t>
+                      </a:r>
+                      <a:r>
+                        <a:rPr lang="en-US" sz="1400" kern="1200" baseline="0" dirty="0" smtClean="0">
+                          <a:solidFill>
+                            <a:schemeClr val="dk1"/>
+                          </a:solidFill>
+                          <a:latin typeface="+mn-lt"/>
+                          <a:ea typeface="+mn-ea"/>
+                          <a:cs typeface="+mn-cs"/>
+                        </a:rPr>
+                        <a:t> for </a:t>
+                      </a:r>
+                      <a:r>
+                        <a:rPr lang="en-US" sz="1400" kern="1200" baseline="0" smtClean="0">
+                          <a:solidFill>
+                            <a:schemeClr val="dk1"/>
+                          </a:solidFill>
+                          <a:latin typeface="+mn-lt"/>
+                          <a:ea typeface="+mn-ea"/>
+                          <a:cs typeface="+mn-cs"/>
+                        </a:rPr>
+                        <a:t>last query</a:t>
                       </a:r>
                       <a:endParaRPr lang="en-US" sz="1400" kern="1200" dirty="0">
                         <a:solidFill>

</xml_diff>